<commit_message>
final update I hope
</commit_message>
<xml_diff>
--- a/biotrain-2019/Myers-Lab-Comp-Bio.pptx
+++ b/biotrain-2019/Myers-Lab-Comp-Bio.pptx
@@ -5,7 +5,7 @@
     <p:sldMasterId id="2147483648" r:id="rId1"/>
   </p:sldMasterIdLst>
   <p:notesMasterIdLst>
-    <p:notesMasterId r:id="rId13"/>
+    <p:notesMasterId r:id="rId14"/>
   </p:notesMasterIdLst>
   <p:sldIdLst>
     <p:sldId id="320" r:id="rId2"/>
@@ -19,6 +19,7 @@
     <p:sldId id="317" r:id="rId10"/>
     <p:sldId id="318" r:id="rId11"/>
     <p:sldId id="319" r:id="rId12"/>
+    <p:sldId id="321" r:id="rId13"/>
   </p:sldIdLst>
   <p:sldSz cx="9144000" cy="6858000" type="screen4x3"/>
   <p:notesSz cx="6858000" cy="9144000"/>
@@ -218,7 +219,7 @@
           <a:p>
             <a:fld id="{E8E7AF6E-CAA8-CF47-9166-EEF4B1279BDA}" type="datetimeFigureOut">
               <a:rPr lang="en-US" smtClean="0"/>
-              <a:t>5/30/19</a:t>
+              <a:t>5/31/19</a:t>
             </a:fld>
             <a:endParaRPr lang="en-US"/>
           </a:p>
@@ -1672,7 +1673,7 @@
           <a:p>
             <a:fld id="{D5F7E5AE-4F70-FD47-95D3-BF4E86987C9F}" type="datetimeFigureOut">
               <a:rPr lang="en-US" smtClean="0"/>
-              <a:t>5/30/19</a:t>
+              <a:t>5/31/19</a:t>
             </a:fld>
             <a:endParaRPr lang="en-US"/>
           </a:p>
@@ -1856,7 +1857,7 @@
           <a:p>
             <a:fld id="{D5F7E5AE-4F70-FD47-95D3-BF4E86987C9F}" type="datetimeFigureOut">
               <a:rPr lang="en-US" smtClean="0"/>
-              <a:t>5/30/19</a:t>
+              <a:t>5/31/19</a:t>
             </a:fld>
             <a:endParaRPr lang="en-US"/>
           </a:p>
@@ -2050,7 +2051,7 @@
           <a:p>
             <a:fld id="{D5F7E5AE-4F70-FD47-95D3-BF4E86987C9F}" type="datetimeFigureOut">
               <a:rPr lang="en-US" smtClean="0"/>
-              <a:t>5/30/19</a:t>
+              <a:t>5/31/19</a:t>
             </a:fld>
             <a:endParaRPr lang="en-US"/>
           </a:p>
@@ -2234,7 +2235,7 @@
           <a:p>
             <a:fld id="{D5F7E5AE-4F70-FD47-95D3-BF4E86987C9F}" type="datetimeFigureOut">
               <a:rPr lang="en-US" smtClean="0"/>
-              <a:t>5/30/19</a:t>
+              <a:t>5/31/19</a:t>
             </a:fld>
             <a:endParaRPr lang="en-US"/>
           </a:p>
@@ -2495,7 +2496,7 @@
           <a:p>
             <a:fld id="{D5F7E5AE-4F70-FD47-95D3-BF4E86987C9F}" type="datetimeFigureOut">
               <a:rPr lang="en-US" smtClean="0"/>
-              <a:t>5/30/19</a:t>
+              <a:t>5/31/19</a:t>
             </a:fld>
             <a:endParaRPr lang="en-US"/>
           </a:p>
@@ -2796,7 +2797,7 @@
           <a:p>
             <a:fld id="{D5F7E5AE-4F70-FD47-95D3-BF4E86987C9F}" type="datetimeFigureOut">
               <a:rPr lang="en-US" smtClean="0"/>
-              <a:t>5/30/19</a:t>
+              <a:t>5/31/19</a:t>
             </a:fld>
             <a:endParaRPr lang="en-US"/>
           </a:p>
@@ -3231,7 +3232,7 @@
           <a:p>
             <a:fld id="{D5F7E5AE-4F70-FD47-95D3-BF4E86987C9F}" type="datetimeFigureOut">
               <a:rPr lang="en-US" smtClean="0"/>
-              <a:t>5/30/19</a:t>
+              <a:t>5/31/19</a:t>
             </a:fld>
             <a:endParaRPr lang="en-US"/>
           </a:p>
@@ -3364,7 +3365,7 @@
           <a:p>
             <a:fld id="{D5F7E5AE-4F70-FD47-95D3-BF4E86987C9F}" type="datetimeFigureOut">
               <a:rPr lang="en-US" smtClean="0"/>
-              <a:t>5/30/19</a:t>
+              <a:t>5/31/19</a:t>
             </a:fld>
             <a:endParaRPr lang="en-US"/>
           </a:p>
@@ -3475,7 +3476,7 @@
           <a:p>
             <a:fld id="{D5F7E5AE-4F70-FD47-95D3-BF4E86987C9F}" type="datetimeFigureOut">
               <a:rPr lang="en-US" smtClean="0"/>
-              <a:t>5/30/19</a:t>
+              <a:t>5/31/19</a:t>
             </a:fld>
             <a:endParaRPr lang="en-US"/>
           </a:p>
@@ -3766,7 +3767,7 @@
           <a:p>
             <a:fld id="{D5F7E5AE-4F70-FD47-95D3-BF4E86987C9F}" type="datetimeFigureOut">
               <a:rPr lang="en-US" smtClean="0"/>
-              <a:t>5/30/19</a:t>
+              <a:t>5/31/19</a:t>
             </a:fld>
             <a:endParaRPr lang="en-US"/>
           </a:p>
@@ -4034,7 +4035,7 @@
           <a:p>
             <a:fld id="{D5F7E5AE-4F70-FD47-95D3-BF4E86987C9F}" type="datetimeFigureOut">
               <a:rPr lang="en-US" smtClean="0"/>
-              <a:t>5/30/19</a:t>
+              <a:t>5/31/19</a:t>
             </a:fld>
             <a:endParaRPr lang="en-US"/>
           </a:p>
@@ -5489,6 +5490,114 @@
     <p:extLst>
       <p:ext uri="{BB962C8B-B14F-4D97-AF65-F5344CB8AC3E}">
         <p14:creationId xmlns:p14="http://schemas.microsoft.com/office/powerpoint/2010/main" val="3856728536"/>
+      </p:ext>
+    </p:extLst>
+  </p:cSld>
+  <p:clrMapOvr>
+    <a:masterClrMapping/>
+  </p:clrMapOvr>
+</p:sld>
+</file>
+
+<file path=ppt/slides/slide12.xml><?xml version="1.0" encoding="utf-8"?>
+<p:sld xmlns:a="http://schemas.openxmlformats.org/drawingml/2006/main" xmlns:r="http://schemas.openxmlformats.org/officeDocument/2006/relationships" xmlns:p="http://schemas.openxmlformats.org/presentationml/2006/main">
+  <p:cSld>
+    <p:spTree>
+      <p:nvGrpSpPr>
+        <p:cNvPr id="1" name=""/>
+        <p:cNvGrpSpPr/>
+        <p:nvPr/>
+      </p:nvGrpSpPr>
+      <p:grpSpPr>
+        <a:xfrm>
+          <a:off x="0" y="0"/>
+          <a:ext cx="0" cy="0"/>
+          <a:chOff x="0" y="0"/>
+          <a:chExt cx="0" cy="0"/>
+        </a:xfrm>
+      </p:grpSpPr>
+      <p:sp>
+        <p:nvSpPr>
+          <p:cNvPr id="2" name="Title 1">
+            <a:extLst>
+              <a:ext uri="{FF2B5EF4-FFF2-40B4-BE49-F238E27FC236}">
+                <a16:creationId xmlns:a16="http://schemas.microsoft.com/office/drawing/2014/main" id="{02F8829F-0660-1A49-9064-F0ED2F3F07F6}"/>
+              </a:ext>
+            </a:extLst>
+          </p:cNvPr>
+          <p:cNvSpPr>
+            <a:spLocks noGrp="1"/>
+          </p:cNvSpPr>
+          <p:nvPr>
+            <p:ph type="title"/>
+          </p:nvPr>
+        </p:nvSpPr>
+        <p:spPr/>
+        <p:txBody>
+          <a:bodyPr/>
+          <a:lstStyle/>
+          <a:p>
+            <a:r>
+              <a:rPr lang="en-US" dirty="0"/>
+              <a:t>Summary</a:t>
+            </a:r>
+          </a:p>
+        </p:txBody>
+      </p:sp>
+      <p:sp>
+        <p:nvSpPr>
+          <p:cNvPr id="3" name="Content Placeholder 2">
+            <a:extLst>
+              <a:ext uri="{FF2B5EF4-FFF2-40B4-BE49-F238E27FC236}">
+                <a16:creationId xmlns:a16="http://schemas.microsoft.com/office/drawing/2014/main" id="{11AFA04C-312C-6E48-B5D6-910CC5B2FA85}"/>
+              </a:ext>
+            </a:extLst>
+          </p:cNvPr>
+          <p:cNvSpPr>
+            <a:spLocks noGrp="1"/>
+          </p:cNvSpPr>
+          <p:nvPr>
+            <p:ph idx="1"/>
+          </p:nvPr>
+        </p:nvSpPr>
+        <p:spPr/>
+        <p:txBody>
+          <a:bodyPr/>
+          <a:lstStyle/>
+          <a:p>
+            <a:r>
+              <a:rPr lang="en-US" dirty="0"/>
+              <a:t>Understanding how regulatory variants act is important for better understanding disease.</a:t>
+            </a:r>
+          </a:p>
+          <a:p>
+            <a:r>
+              <a:rPr lang="en-US"/>
+              <a:t>One </a:t>
+            </a:r>
+            <a:r>
+              <a:rPr lang="en-US" dirty="0"/>
+              <a:t>way that a regulatory variant can act is by modifying transcription factor binding.</a:t>
+            </a:r>
+          </a:p>
+          <a:p>
+            <a:r>
+              <a:rPr lang="en-US" dirty="0"/>
+              <a:t>I use machine learning algorithms to identify variants likely to influence TF binding.</a:t>
+            </a:r>
+          </a:p>
+          <a:p>
+            <a:pPr marL="0" indent="0">
+              <a:buNone/>
+            </a:pPr>
+            <a:endParaRPr lang="en-US" dirty="0"/>
+          </a:p>
+        </p:txBody>
+      </p:sp>
+    </p:spTree>
+    <p:extLst>
+      <p:ext uri="{BB962C8B-B14F-4D97-AF65-F5344CB8AC3E}">
+        <p14:creationId xmlns:p14="http://schemas.microsoft.com/office/powerpoint/2010/main" val="3760661716"/>
       </p:ext>
     </p:extLst>
   </p:cSld>

</xml_diff>